<commit_message>
Add model deployment to the project
</commit_message>
<xml_diff>
--- a/case_study_sample_deck_jin_meng.pptx
+++ b/case_study_sample_deck_jin_meng.pptx
@@ -218,7 +218,7 @@
           <a:p>
             <a:fld id="{4EBF85B4-A467-4B5C-B35B-A3E2A8841D96}" type="datetimeFigureOut">
               <a:rPr lang="en-US" smtClean="0"/>
-              <a:t>8/27/2025</a:t>
+              <a:t>8/28/2025</a:t>
             </a:fld>
             <a:endParaRPr lang="en-US"/>
           </a:p>
@@ -1660,7 +1660,7 @@
           <a:p>
             <a:fld id="{ACF36A98-F08A-4CFD-BE0D-05F2CBB67E88}" type="datetimeFigureOut">
               <a:rPr lang="en-US" smtClean="0"/>
-              <a:t>8/27/2025</a:t>
+              <a:t>8/28/2025</a:t>
             </a:fld>
             <a:endParaRPr lang="en-US"/>
           </a:p>
@@ -1830,7 +1830,7 @@
           <a:p>
             <a:fld id="{ACF36A98-F08A-4CFD-BE0D-05F2CBB67E88}" type="datetimeFigureOut">
               <a:rPr lang="en-US" smtClean="0"/>
-              <a:t>8/27/2025</a:t>
+              <a:t>8/28/2025</a:t>
             </a:fld>
             <a:endParaRPr lang="en-US"/>
           </a:p>
@@ -2010,7 +2010,7 @@
           <a:p>
             <a:fld id="{ACF36A98-F08A-4CFD-BE0D-05F2CBB67E88}" type="datetimeFigureOut">
               <a:rPr lang="en-US" smtClean="0"/>
-              <a:t>8/27/2025</a:t>
+              <a:t>8/28/2025</a:t>
             </a:fld>
             <a:endParaRPr lang="en-US"/>
           </a:p>
@@ -2180,7 +2180,7 @@
           <a:p>
             <a:fld id="{ACF36A98-F08A-4CFD-BE0D-05F2CBB67E88}" type="datetimeFigureOut">
               <a:rPr lang="en-US" smtClean="0"/>
-              <a:t>8/27/2025</a:t>
+              <a:t>8/28/2025</a:t>
             </a:fld>
             <a:endParaRPr lang="en-US"/>
           </a:p>
@@ -2426,7 +2426,7 @@
           <a:p>
             <a:fld id="{ACF36A98-F08A-4CFD-BE0D-05F2CBB67E88}" type="datetimeFigureOut">
               <a:rPr lang="en-US" smtClean="0"/>
-              <a:t>8/27/2025</a:t>
+              <a:t>8/28/2025</a:t>
             </a:fld>
             <a:endParaRPr lang="en-US"/>
           </a:p>
@@ -2658,7 +2658,7 @@
           <a:p>
             <a:fld id="{ACF36A98-F08A-4CFD-BE0D-05F2CBB67E88}" type="datetimeFigureOut">
               <a:rPr lang="en-US" smtClean="0"/>
-              <a:t>8/27/2025</a:t>
+              <a:t>8/28/2025</a:t>
             </a:fld>
             <a:endParaRPr lang="en-US"/>
           </a:p>
@@ -3025,7 +3025,7 @@
           <a:p>
             <a:fld id="{ACF36A98-F08A-4CFD-BE0D-05F2CBB67E88}" type="datetimeFigureOut">
               <a:rPr lang="en-US" smtClean="0"/>
-              <a:t>8/27/2025</a:t>
+              <a:t>8/28/2025</a:t>
             </a:fld>
             <a:endParaRPr lang="en-US"/>
           </a:p>
@@ -3143,7 +3143,7 @@
           <a:p>
             <a:fld id="{ACF36A98-F08A-4CFD-BE0D-05F2CBB67E88}" type="datetimeFigureOut">
               <a:rPr lang="en-US" smtClean="0"/>
-              <a:t>8/27/2025</a:t>
+              <a:t>8/28/2025</a:t>
             </a:fld>
             <a:endParaRPr lang="en-US"/>
           </a:p>
@@ -3238,7 +3238,7 @@
           <a:p>
             <a:fld id="{ACF36A98-F08A-4CFD-BE0D-05F2CBB67E88}" type="datetimeFigureOut">
               <a:rPr lang="en-US" smtClean="0"/>
-              <a:t>8/27/2025</a:t>
+              <a:t>8/28/2025</a:t>
             </a:fld>
             <a:endParaRPr lang="en-US"/>
           </a:p>
@@ -3515,7 +3515,7 @@
           <a:p>
             <a:fld id="{ACF36A98-F08A-4CFD-BE0D-05F2CBB67E88}" type="datetimeFigureOut">
               <a:rPr lang="en-US" smtClean="0"/>
-              <a:t>8/27/2025</a:t>
+              <a:t>8/28/2025</a:t>
             </a:fld>
             <a:endParaRPr lang="en-US"/>
           </a:p>
@@ -3772,7 +3772,7 @@
           <a:p>
             <a:fld id="{ACF36A98-F08A-4CFD-BE0D-05F2CBB67E88}" type="datetimeFigureOut">
               <a:rPr lang="en-US" smtClean="0"/>
-              <a:t>8/27/2025</a:t>
+              <a:t>8/28/2025</a:t>
             </a:fld>
             <a:endParaRPr lang="en-US"/>
           </a:p>
@@ -3985,7 +3985,7 @@
           <a:p>
             <a:fld id="{ACF36A98-F08A-4CFD-BE0D-05F2CBB67E88}" type="datetimeFigureOut">
               <a:rPr lang="en-US" smtClean="0"/>
-              <a:t>8/27/2025</a:t>
+              <a:t>8/28/2025</a:t>
             </a:fld>
             <a:endParaRPr lang="en-US"/>
           </a:p>

</xml_diff>